<commit_message>
Update Reprezentare grafica a algoritmului roy-floyd (no memes).pptx
</commit_message>
<xml_diff>
--- a/Roy-Floyd grafic/Reprezentare grafica a algoritmului roy-floyd (no memes).pptx
+++ b/Roy-Floyd grafic/Reprezentare grafica a algoritmului roy-floyd (no memes).pptx
@@ -12,17 +12,18 @@
     <p:sldId id="259" r:id="rId6"/>
     <p:sldId id="260" r:id="rId7"/>
     <p:sldId id="263" r:id="rId8"/>
-    <p:sldId id="267" r:id="rId9"/>
-    <p:sldId id="265" r:id="rId10"/>
-    <p:sldId id="268" r:id="rId11"/>
-    <p:sldId id="264" r:id="rId12"/>
-    <p:sldId id="269" r:id="rId13"/>
-    <p:sldId id="266" r:id="rId14"/>
-    <p:sldId id="262" r:id="rId15"/>
-    <p:sldId id="271" r:id="rId16"/>
-    <p:sldId id="272" r:id="rId17"/>
-    <p:sldId id="273" r:id="rId18"/>
-    <p:sldId id="274" r:id="rId19"/>
+    <p:sldId id="275" r:id="rId9"/>
+    <p:sldId id="267" r:id="rId10"/>
+    <p:sldId id="265" r:id="rId11"/>
+    <p:sldId id="268" r:id="rId12"/>
+    <p:sldId id="264" r:id="rId13"/>
+    <p:sldId id="269" r:id="rId14"/>
+    <p:sldId id="266" r:id="rId15"/>
+    <p:sldId id="262" r:id="rId16"/>
+    <p:sldId id="271" r:id="rId17"/>
+    <p:sldId id="272" r:id="rId18"/>
+    <p:sldId id="273" r:id="rId19"/>
+    <p:sldId id="274" r:id="rId20"/>
   </p:sldIdLst>
   <p:sldSz cx="12192000" cy="6858000"/>
   <p:notesSz cx="6858000" cy="9144000"/>
@@ -12487,6 +12488,322 @@
           <a:chExt cx="0" cy="0"/>
         </a:xfrm>
       </p:grpSpPr>
+      <p:pic>
+        <p:nvPicPr>
+          <p:cNvPr id="3" name="Picture 2">
+            <a:extLst>
+              <a:ext uri="{FF2B5EF4-FFF2-40B4-BE49-F238E27FC236}">
+                <a16:creationId xmlns:a16="http://schemas.microsoft.com/office/drawing/2014/main" id="{9974BC64-0080-4F43-BB45-16DA3C3A8AAF}"/>
+              </a:ext>
+            </a:extLst>
+          </p:cNvPr>
+          <p:cNvPicPr>
+            <a:picLocks noChangeAspect="1"/>
+          </p:cNvPicPr>
+          <p:nvPr/>
+        </p:nvPicPr>
+        <p:blipFill>
+          <a:blip r:embed="rId2"/>
+          <a:stretch>
+            <a:fillRect/>
+          </a:stretch>
+        </p:blipFill>
+        <p:spPr>
+          <a:xfrm>
+            <a:off x="6096000" y="1274279"/>
+            <a:ext cx="5319221" cy="3833192"/>
+          </a:xfrm>
+          <a:prstGeom prst="rect">
+            <a:avLst/>
+          </a:prstGeom>
+        </p:spPr>
+      </p:pic>
+      <p:sp>
+        <p:nvSpPr>
+          <p:cNvPr id="4" name="TextBox 3">
+            <a:extLst>
+              <a:ext uri="{FF2B5EF4-FFF2-40B4-BE49-F238E27FC236}">
+                <a16:creationId xmlns:a16="http://schemas.microsoft.com/office/drawing/2014/main" id="{2C7C0989-B024-49C1-88D3-66C8D786AA68}"/>
+              </a:ext>
+            </a:extLst>
+          </p:cNvPr>
+          <p:cNvSpPr txBox="1"/>
+          <p:nvPr/>
+        </p:nvSpPr>
+        <p:spPr>
+          <a:xfrm>
+            <a:off x="981075" y="583156"/>
+            <a:ext cx="5114925" cy="4801314"/>
+          </a:xfrm>
+          <a:prstGeom prst="rect">
+            <a:avLst/>
+          </a:prstGeom>
+          <a:noFill/>
+        </p:spPr>
+        <p:txBody>
+          <a:bodyPr wrap="square" rtlCol="0">
+            <a:spAutoFit/>
+          </a:bodyPr>
+          <a:lstStyle/>
+          <a:p>
+            <a:r>
+              <a:rPr lang="en-US">
+                <a:solidFill>
+                  <a:schemeClr val="bg1"/>
+                </a:solidFill>
+              </a:rPr>
+              <a:t>if (event.key.code == sf::Keyboard::M)</a:t>
+            </a:r>
+          </a:p>
+          <a:p>
+            <a:endParaRPr lang="en-US">
+              <a:solidFill>
+                <a:schemeClr val="bg1"/>
+              </a:solidFill>
+            </a:endParaRPr>
+          </a:p>
+          <a:p>
+            <a:r>
+              <a:rPr lang="nn-NO">
+                <a:solidFill>
+                  <a:schemeClr val="bg1"/>
+                </a:solidFill>
+              </a:rPr>
+              <a:t>for (int i = 0; i &lt; nodes.size(); i++)</a:t>
+            </a:r>
+          </a:p>
+          <a:p>
+            <a:r>
+              <a:rPr lang="en-US">
+                <a:solidFill>
+                  <a:schemeClr val="bg1"/>
+                </a:solidFill>
+              </a:rPr>
+              <a:t>{</a:t>
+            </a:r>
+          </a:p>
+          <a:p>
+            <a:r>
+              <a:rPr lang="en-US">
+                <a:solidFill>
+                  <a:schemeClr val="bg1"/>
+                </a:solidFill>
+              </a:rPr>
+              <a:t>pos.push_back(nodes[i].getPosition());</a:t>
+            </a:r>
+          </a:p>
+          <a:p>
+            <a:r>
+              <a:rPr lang="en-US">
+                <a:solidFill>
+                  <a:schemeClr val="bg1"/>
+                </a:solidFill>
+              </a:rPr>
+              <a:t>}</a:t>
+            </a:r>
+          </a:p>
+          <a:p>
+            <a:endParaRPr lang="en-US">
+              <a:solidFill>
+                <a:schemeClr val="bg1"/>
+              </a:solidFill>
+            </a:endParaRPr>
+          </a:p>
+          <a:p>
+            <a:r>
+              <a:rPr lang="nn-NO">
+                <a:solidFill>
+                  <a:schemeClr val="bg1"/>
+                </a:solidFill>
+              </a:rPr>
+              <a:t>for (int i = 0; i &lt; pos.size(); i++)</a:t>
+            </a:r>
+          </a:p>
+          <a:p>
+            <a:r>
+              <a:rPr lang="en-US">
+                <a:solidFill>
+                  <a:schemeClr val="bg1"/>
+                </a:solidFill>
+              </a:rPr>
+              <a:t>{</a:t>
+            </a:r>
+          </a:p>
+          <a:p>
+            <a:r>
+              <a:rPr lang="en-US">
+                <a:solidFill>
+                  <a:schemeClr val="bg1"/>
+                </a:solidFill>
+              </a:rPr>
+              <a:t>for (int j = 0; j &lt; pos.size(); j++)</a:t>
+            </a:r>
+          </a:p>
+          <a:p>
+            <a:r>
+              <a:rPr lang="en-US">
+                <a:solidFill>
+                  <a:schemeClr val="bg1"/>
+                </a:solidFill>
+              </a:rPr>
+              <a:t>{</a:t>
+            </a:r>
+          </a:p>
+          <a:p>
+            <a:r>
+              <a:rPr lang="en-US">
+                <a:solidFill>
+                  <a:schemeClr val="bg1"/>
+                </a:solidFill>
+              </a:rPr>
+              <a:t>if (a[i][j])</a:t>
+            </a:r>
+          </a:p>
+          <a:p>
+            <a:r>
+              <a:rPr lang="en-US">
+                <a:solidFill>
+                  <a:schemeClr val="bg1"/>
+                </a:solidFill>
+              </a:rPr>
+              <a:t>{</a:t>
+            </a:r>
+          </a:p>
+          <a:p>
+            <a:r>
+              <a:rPr lang="en-US">
+                <a:solidFill>
+                  <a:schemeClr val="bg1"/>
+                </a:solidFill>
+              </a:rPr>
+              <a:t>draw_edge_store_in_vector(i, j, sf::Color::Black, edges);</a:t>
+            </a:r>
+          </a:p>
+          <a:p>
+            <a:r>
+              <a:rPr lang="en-US">
+                <a:solidFill>
+                  <a:schemeClr val="bg1"/>
+                </a:solidFill>
+              </a:rPr>
+              <a:t>}</a:t>
+            </a:r>
+          </a:p>
+          <a:p>
+            <a:r>
+              <a:rPr lang="en-US">
+                <a:solidFill>
+                  <a:schemeClr val="bg1"/>
+                </a:solidFill>
+              </a:rPr>
+              <a:t>}</a:t>
+            </a:r>
+          </a:p>
+        </p:txBody>
+      </p:sp>
+      <p:sp>
+        <p:nvSpPr>
+          <p:cNvPr id="5" name="TextBox 4">
+            <a:extLst>
+              <a:ext uri="{FF2B5EF4-FFF2-40B4-BE49-F238E27FC236}">
+                <a16:creationId xmlns:a16="http://schemas.microsoft.com/office/drawing/2014/main" id="{141408A5-C076-46E9-A63A-19566E868302}"/>
+              </a:ext>
+            </a:extLst>
+          </p:cNvPr>
+          <p:cNvSpPr txBox="1"/>
+          <p:nvPr/>
+        </p:nvSpPr>
+        <p:spPr>
+          <a:xfrm>
+            <a:off x="9537192" y="210312"/>
+            <a:ext cx="2322576" cy="830997"/>
+          </a:xfrm>
+          <a:prstGeom prst="rect">
+            <a:avLst/>
+          </a:prstGeom>
+          <a:noFill/>
+        </p:spPr>
+        <p:txBody>
+          <a:bodyPr wrap="square" rtlCol="0">
+            <a:spAutoFit/>
+          </a:bodyPr>
+          <a:lstStyle/>
+          <a:p>
+            <a:r>
+              <a:rPr lang="en-US" sz="4800">
+                <a:solidFill>
+                  <a:schemeClr val="bg1"/>
+                </a:solidFill>
+              </a:rPr>
+              <a:t>Ziua 2</a:t>
+            </a:r>
+          </a:p>
+        </p:txBody>
+      </p:sp>
+    </p:spTree>
+    <p:extLst>
+      <p:ext uri="{BB962C8B-B14F-4D97-AF65-F5344CB8AC3E}">
+        <p14:creationId xmlns:p14="http://schemas.microsoft.com/office/powerpoint/2010/main" val="1706201723"/>
+      </p:ext>
+    </p:extLst>
+  </p:cSld>
+  <p:clrMapOvr>
+    <a:masterClrMapping/>
+  </p:clrMapOvr>
+</p:sld>
+</file>
+
+<file path=ppt/slides/slide11.xml><?xml version="1.0" encoding="utf-8"?>
+<p:sld xmlns:a="http://schemas.openxmlformats.org/drawingml/2006/main" xmlns:r="http://schemas.openxmlformats.org/officeDocument/2006/relationships" xmlns:p="http://schemas.openxmlformats.org/presentationml/2006/main">
+  <p:cSld>
+    <p:bg>
+      <p:bgPr>
+        <a:gradFill>
+          <a:gsLst>
+            <a:gs pos="0">
+              <a:schemeClr val="accent1">
+                <a:lumMod val="5000"/>
+                <a:lumOff val="95000"/>
+              </a:schemeClr>
+            </a:gs>
+            <a:gs pos="74000">
+              <a:schemeClr val="accent1">
+                <a:lumMod val="45000"/>
+                <a:lumOff val="55000"/>
+              </a:schemeClr>
+            </a:gs>
+            <a:gs pos="83000">
+              <a:schemeClr val="accent1">
+                <a:lumMod val="45000"/>
+                <a:lumOff val="55000"/>
+              </a:schemeClr>
+            </a:gs>
+            <a:gs pos="100000">
+              <a:schemeClr val="accent1">
+                <a:lumMod val="30000"/>
+                <a:lumOff val="70000"/>
+              </a:schemeClr>
+            </a:gs>
+          </a:gsLst>
+          <a:lin ang="5400000" scaled="1"/>
+        </a:gradFill>
+        <a:effectLst/>
+      </p:bgPr>
+    </p:bg>
+    <p:spTree>
+      <p:nvGrpSpPr>
+        <p:cNvPr id="1" name=""/>
+        <p:cNvGrpSpPr/>
+        <p:nvPr/>
+      </p:nvGrpSpPr>
+      <p:grpSpPr>
+        <a:xfrm>
+          <a:off x="0" y="0"/>
+          <a:ext cx="0" cy="0"/>
+          <a:chOff x="0" y="0"/>
+          <a:chExt cx="0" cy="0"/>
+        </a:xfrm>
+      </p:grpSpPr>
       <p:sp>
         <p:nvSpPr>
           <p:cNvPr id="2" name="TextBox 1">
@@ -12619,7 +12936,7 @@
 </p:sld>
 </file>
 
-<file path=ppt/slides/slide11.xml><?xml version="1.0" encoding="utf-8"?>
+<file path=ppt/slides/slide12.xml><?xml version="1.0" encoding="utf-8"?>
 <p:sld xmlns:a="http://schemas.openxmlformats.org/drawingml/2006/main" xmlns:r="http://schemas.openxmlformats.org/officeDocument/2006/relationships" xmlns:p="http://schemas.openxmlformats.org/presentationml/2006/main">
   <p:cSld>
     <p:bg>
@@ -12951,7 +13268,7 @@
 </p:sld>
 </file>
 
-<file path=ppt/slides/slide12.xml><?xml version="1.0" encoding="utf-8"?>
+<file path=ppt/slides/slide13.xml><?xml version="1.0" encoding="utf-8"?>
 <p:sld xmlns:a="http://schemas.openxmlformats.org/drawingml/2006/main" xmlns:r="http://schemas.openxmlformats.org/officeDocument/2006/relationships" xmlns:p="http://schemas.openxmlformats.org/presentationml/2006/main">
   <p:cSld>
     <p:bg>
@@ -13302,7 +13619,7 @@
 </p:sld>
 </file>
 
-<file path=ppt/slides/slide13.xml><?xml version="1.0" encoding="utf-8"?>
+<file path=ppt/slides/slide14.xml><?xml version="1.0" encoding="utf-8"?>
 <p:sld xmlns:a="http://schemas.openxmlformats.org/drawingml/2006/main" xmlns:r="http://schemas.openxmlformats.org/officeDocument/2006/relationships" xmlns:p="http://schemas.openxmlformats.org/presentationml/2006/main">
   <p:cSld>
     <p:bg>
@@ -13669,7 +13986,7 @@
 </p:sld>
 </file>
 
-<file path=ppt/slides/slide14.xml><?xml version="1.0" encoding="utf-8"?>
+<file path=ppt/slides/slide15.xml><?xml version="1.0" encoding="utf-8"?>
 <p:sld xmlns:a="http://schemas.openxmlformats.org/drawingml/2006/main" xmlns:r="http://schemas.openxmlformats.org/officeDocument/2006/relationships" xmlns:p="http://schemas.openxmlformats.org/presentationml/2006/main">
   <p:cSld>
     <p:bg>
@@ -13802,7 +14119,7 @@
 </p:sld>
 </file>
 
-<file path=ppt/slides/slide15.xml><?xml version="1.0" encoding="utf-8"?>
+<file path=ppt/slides/slide16.xml><?xml version="1.0" encoding="utf-8"?>
 <p:sld xmlns:a="http://schemas.openxmlformats.org/drawingml/2006/main" xmlns:r="http://schemas.openxmlformats.org/officeDocument/2006/relationships" xmlns:p="http://schemas.openxmlformats.org/presentationml/2006/main">
   <p:cSld>
     <p:bg>
@@ -14020,7 +14337,7 @@
 </p:sld>
 </file>
 
-<file path=ppt/slides/slide16.xml><?xml version="1.0" encoding="utf-8"?>
+<file path=ppt/slides/slide17.xml><?xml version="1.0" encoding="utf-8"?>
 <p:sld xmlns:a="http://schemas.openxmlformats.org/drawingml/2006/main" xmlns:r="http://schemas.openxmlformats.org/officeDocument/2006/relationships" xmlns:p="http://schemas.openxmlformats.org/presentationml/2006/main">
   <p:cSld>
     <p:bg>
@@ -14283,7 +14600,7 @@
 </p:sld>
 </file>
 
-<file path=ppt/slides/slide17.xml><?xml version="1.0" encoding="utf-8"?>
+<file path=ppt/slides/slide18.xml><?xml version="1.0" encoding="utf-8"?>
 <p:sld xmlns:a="http://schemas.openxmlformats.org/drawingml/2006/main" xmlns:r="http://schemas.openxmlformats.org/officeDocument/2006/relationships" xmlns:p="http://schemas.openxmlformats.org/presentationml/2006/main">
   <p:cSld>
     <p:bg>
@@ -14480,7 +14797,7 @@
 </p:sld>
 </file>
 
-<file path=ppt/slides/slide18.xml><?xml version="1.0" encoding="utf-8"?>
+<file path=ppt/slides/slide19.xml><?xml version="1.0" encoding="utf-8"?>
 <p:sld xmlns:a="http://schemas.openxmlformats.org/drawingml/2006/main" xmlns:r="http://schemas.openxmlformats.org/officeDocument/2006/relationships" xmlns:p="http://schemas.openxmlformats.org/presentationml/2006/main">
   <p:cSld>
     <p:bg>
@@ -15383,7 +15700,7 @@
         </p:blipFill>
         <p:spPr>
           <a:xfrm>
-            <a:off x="6305550" y="1585912"/>
+            <a:off x="6305550" y="1041309"/>
             <a:ext cx="5229225" cy="3686176"/>
           </a:xfrm>
           <a:prstGeom prst="rect">
@@ -15674,6 +15991,243 @@
 </file>
 
 <file path=ppt/slides/slide8.xml><?xml version="1.0" encoding="utf-8"?>
+<p:sld xmlns:a="http://schemas.openxmlformats.org/drawingml/2006/main" xmlns:r="http://schemas.openxmlformats.org/officeDocument/2006/relationships" xmlns:p="http://schemas.openxmlformats.org/presentationml/2006/main">
+  <p:cSld>
+    <p:bg>
+      <p:bgPr>
+        <a:gradFill>
+          <a:gsLst>
+            <a:gs pos="0">
+              <a:schemeClr val="accent1">
+                <a:lumMod val="5000"/>
+                <a:lumOff val="95000"/>
+              </a:schemeClr>
+            </a:gs>
+            <a:gs pos="74000">
+              <a:schemeClr val="accent1">
+                <a:lumMod val="45000"/>
+                <a:lumOff val="55000"/>
+              </a:schemeClr>
+            </a:gs>
+            <a:gs pos="83000">
+              <a:schemeClr val="accent1">
+                <a:lumMod val="45000"/>
+                <a:lumOff val="55000"/>
+              </a:schemeClr>
+            </a:gs>
+            <a:gs pos="100000">
+              <a:schemeClr val="accent1">
+                <a:lumMod val="30000"/>
+                <a:lumOff val="70000"/>
+              </a:schemeClr>
+            </a:gs>
+          </a:gsLst>
+          <a:lin ang="5400000" scaled="1"/>
+        </a:gradFill>
+        <a:effectLst/>
+      </p:bgPr>
+    </p:bg>
+    <p:spTree>
+      <p:nvGrpSpPr>
+        <p:cNvPr id="1" name=""/>
+        <p:cNvGrpSpPr/>
+        <p:nvPr/>
+      </p:nvGrpSpPr>
+      <p:grpSpPr>
+        <a:xfrm>
+          <a:off x="0" y="0"/>
+          <a:ext cx="0" cy="0"/>
+          <a:chOff x="0" y="0"/>
+          <a:chExt cx="0" cy="0"/>
+        </a:xfrm>
+      </p:grpSpPr>
+      <p:sp>
+        <p:nvSpPr>
+          <p:cNvPr id="2" name="TextBox 1">
+            <a:extLst>
+              <a:ext uri="{FF2B5EF4-FFF2-40B4-BE49-F238E27FC236}">
+                <a16:creationId xmlns:a16="http://schemas.microsoft.com/office/drawing/2014/main" id="{B53AD845-BC0A-44C3-B649-E03B8F1C5EBF}"/>
+              </a:ext>
+            </a:extLst>
+          </p:cNvPr>
+          <p:cNvSpPr txBox="1"/>
+          <p:nvPr/>
+        </p:nvSpPr>
+        <p:spPr>
+          <a:xfrm>
+            <a:off x="1600200" y="3751749"/>
+            <a:ext cx="7948288" cy="2862322"/>
+          </a:xfrm>
+          <a:prstGeom prst="rect">
+            <a:avLst/>
+          </a:prstGeom>
+          <a:noFill/>
+        </p:spPr>
+        <p:txBody>
+          <a:bodyPr wrap="square" rtlCol="0">
+            <a:spAutoFit/>
+          </a:bodyPr>
+          <a:lstStyle/>
+          <a:p>
+            <a:r>
+              <a:rPr lang="en-US" sz="2000">
+                <a:solidFill>
+                  <a:schemeClr val="bg1"/>
+                </a:solidFill>
+              </a:rPr>
+              <a:t>This clear/draw/display cycle is the only good way to draw things. Don't try other strategies, such as keeping pixels from the previous frame, "erasing" pixels, or drawing once and calling display multiple times. You'll get strange results due to double-buffering.</a:t>
+            </a:r>
+            <a:br>
+              <a:rPr lang="en-US" sz="2000">
+                <a:solidFill>
+                  <a:schemeClr val="bg1"/>
+                </a:solidFill>
+              </a:rPr>
+            </a:br>
+            <a:r>
+              <a:rPr lang="en-US" sz="2000">
+                <a:solidFill>
+                  <a:schemeClr val="bg1"/>
+                </a:solidFill>
+              </a:rPr>
+              <a:t>Modern graphics hardware and APIs are </a:t>
+            </a:r>
+            <a:r>
+              <a:rPr lang="en-US" sz="2000" i="1">
+                <a:solidFill>
+                  <a:schemeClr val="bg1"/>
+                </a:solidFill>
+              </a:rPr>
+              <a:t>really</a:t>
+            </a:r>
+            <a:r>
+              <a:rPr lang="en-US" sz="2000">
+                <a:solidFill>
+                  <a:schemeClr val="bg1"/>
+                </a:solidFill>
+              </a:rPr>
+              <a:t> made for repeated clear/draw/display cycles where everything is completely refreshed at each iteration of the main loop. Don't be scared to draw 1000 sprites 60 times per second, you're far below the millions of triangles that your computer can handle</a:t>
+            </a:r>
+            <a:r>
+              <a:rPr lang="en-US">
+                <a:solidFill>
+                  <a:schemeClr val="bg1"/>
+                </a:solidFill>
+              </a:rPr>
+              <a:t>."</a:t>
+            </a:r>
+          </a:p>
+        </p:txBody>
+      </p:sp>
+      <p:sp>
+        <p:nvSpPr>
+          <p:cNvPr id="3" name="TextBox 2">
+            <a:extLst>
+              <a:ext uri="{FF2B5EF4-FFF2-40B4-BE49-F238E27FC236}">
+                <a16:creationId xmlns:a16="http://schemas.microsoft.com/office/drawing/2014/main" id="{D9909504-2B5F-4158-BD30-C2AB476282EE}"/>
+              </a:ext>
+            </a:extLst>
+          </p:cNvPr>
+          <p:cNvSpPr txBox="1"/>
+          <p:nvPr/>
+        </p:nvSpPr>
+        <p:spPr>
+          <a:xfrm>
+            <a:off x="1600200" y="155174"/>
+            <a:ext cx="2581275" cy="523220"/>
+          </a:xfrm>
+          <a:prstGeom prst="rect">
+            <a:avLst/>
+          </a:prstGeom>
+          <a:noFill/>
+        </p:spPr>
+        <p:txBody>
+          <a:bodyPr wrap="square" rtlCol="0">
+            <a:spAutoFit/>
+          </a:bodyPr>
+          <a:lstStyle/>
+          <a:p>
+            <a:r>
+              <a:rPr lang="en-US" sz="2800" b="1" u="sng">
+                <a:solidFill>
+                  <a:schemeClr val="bg1"/>
+                </a:solidFill>
+              </a:rPr>
+              <a:t>Site SFML</a:t>
+            </a:r>
+          </a:p>
+        </p:txBody>
+      </p:sp>
+      <p:sp>
+        <p:nvSpPr>
+          <p:cNvPr id="10" name="TextBox 9">
+            <a:extLst>
+              <a:ext uri="{FF2B5EF4-FFF2-40B4-BE49-F238E27FC236}">
+                <a16:creationId xmlns:a16="http://schemas.microsoft.com/office/drawing/2014/main" id="{BB996F8A-A27B-4281-9F1E-EE56649DA43C}"/>
+              </a:ext>
+            </a:extLst>
+          </p:cNvPr>
+          <p:cNvSpPr txBox="1"/>
+          <p:nvPr/>
+        </p:nvSpPr>
+        <p:spPr>
+          <a:xfrm>
+            <a:off x="1600200" y="1036710"/>
+            <a:ext cx="9144000" cy="2585323"/>
+          </a:xfrm>
+          <a:prstGeom prst="rect">
+            <a:avLst/>
+          </a:prstGeom>
+          <a:noFill/>
+        </p:spPr>
+        <p:txBody>
+          <a:bodyPr wrap="square" rtlCol="0">
+            <a:spAutoFit/>
+          </a:bodyPr>
+          <a:lstStyle/>
+          <a:p>
+            <a:r>
+              <a:rPr lang="en-US">
+                <a:solidFill>
+                  <a:schemeClr val="bg1"/>
+                </a:solidFill>
+              </a:rPr>
+              <a:t>"Calling clear before drawing anything is mandatory, otherwise the contents from previous frames will be present behind anything you draw. The only exception is when you cover the entire window with what you draw, so that no pixel is not drawn to. In this case you can avoid calling clear (although it won't have a noticeable impact on performance).</a:t>
+            </a:r>
+          </a:p>
+          <a:p>
+            <a:endParaRPr lang="en-US">
+              <a:solidFill>
+                <a:schemeClr val="bg1"/>
+              </a:solidFill>
+            </a:endParaRPr>
+          </a:p>
+          <a:p>
+            <a:r>
+              <a:rPr lang="en-US">
+                <a:solidFill>
+                  <a:schemeClr val="bg1"/>
+                </a:solidFill>
+              </a:rPr>
+              <a:t>Calling display is also mandatory, it takes what was drawn since the last call to display and displays it on the window. Indeed, things are not drawn directly to the window, but to a hidden buffer. This buffer is then copied to the window when you call display -- this is called double-buffering.</a:t>
+            </a:r>
+          </a:p>
+        </p:txBody>
+      </p:sp>
+    </p:spTree>
+    <p:extLst>
+      <p:ext uri="{BB962C8B-B14F-4D97-AF65-F5344CB8AC3E}">
+        <p14:creationId xmlns:p14="http://schemas.microsoft.com/office/powerpoint/2010/main" val="2578662865"/>
+      </p:ext>
+    </p:extLst>
+  </p:cSld>
+  <p:clrMapOvr>
+    <a:masterClrMapping/>
+  </p:clrMapOvr>
+</p:sld>
+</file>
+
+<file path=ppt/slides/slide9.xml><?xml version="1.0" encoding="utf-8"?>
 <p:sld xmlns:a="http://schemas.openxmlformats.org/drawingml/2006/main" xmlns:r="http://schemas.openxmlformats.org/officeDocument/2006/relationships" xmlns:p="http://schemas.openxmlformats.org/presentationml/2006/main">
   <p:cSld>
     <p:bg>
@@ -16016,322 +16570,6 @@
     <p:extLst>
       <p:ext uri="{BB962C8B-B14F-4D97-AF65-F5344CB8AC3E}">
         <p14:creationId xmlns:p14="http://schemas.microsoft.com/office/powerpoint/2010/main" val="167022408"/>
-      </p:ext>
-    </p:extLst>
-  </p:cSld>
-  <p:clrMapOvr>
-    <a:masterClrMapping/>
-  </p:clrMapOvr>
-</p:sld>
-</file>
-
-<file path=ppt/slides/slide9.xml><?xml version="1.0" encoding="utf-8"?>
-<p:sld xmlns:a="http://schemas.openxmlformats.org/drawingml/2006/main" xmlns:r="http://schemas.openxmlformats.org/officeDocument/2006/relationships" xmlns:p="http://schemas.openxmlformats.org/presentationml/2006/main">
-  <p:cSld>
-    <p:bg>
-      <p:bgPr>
-        <a:gradFill>
-          <a:gsLst>
-            <a:gs pos="0">
-              <a:schemeClr val="accent1">
-                <a:lumMod val="5000"/>
-                <a:lumOff val="95000"/>
-              </a:schemeClr>
-            </a:gs>
-            <a:gs pos="74000">
-              <a:schemeClr val="accent1">
-                <a:lumMod val="45000"/>
-                <a:lumOff val="55000"/>
-              </a:schemeClr>
-            </a:gs>
-            <a:gs pos="83000">
-              <a:schemeClr val="accent1">
-                <a:lumMod val="45000"/>
-                <a:lumOff val="55000"/>
-              </a:schemeClr>
-            </a:gs>
-            <a:gs pos="100000">
-              <a:schemeClr val="accent1">
-                <a:lumMod val="30000"/>
-                <a:lumOff val="70000"/>
-              </a:schemeClr>
-            </a:gs>
-          </a:gsLst>
-          <a:lin ang="5400000" scaled="1"/>
-        </a:gradFill>
-        <a:effectLst/>
-      </p:bgPr>
-    </p:bg>
-    <p:spTree>
-      <p:nvGrpSpPr>
-        <p:cNvPr id="1" name=""/>
-        <p:cNvGrpSpPr/>
-        <p:nvPr/>
-      </p:nvGrpSpPr>
-      <p:grpSpPr>
-        <a:xfrm>
-          <a:off x="0" y="0"/>
-          <a:ext cx="0" cy="0"/>
-          <a:chOff x="0" y="0"/>
-          <a:chExt cx="0" cy="0"/>
-        </a:xfrm>
-      </p:grpSpPr>
-      <p:pic>
-        <p:nvPicPr>
-          <p:cNvPr id="3" name="Picture 2">
-            <a:extLst>
-              <a:ext uri="{FF2B5EF4-FFF2-40B4-BE49-F238E27FC236}">
-                <a16:creationId xmlns:a16="http://schemas.microsoft.com/office/drawing/2014/main" id="{9974BC64-0080-4F43-BB45-16DA3C3A8AAF}"/>
-              </a:ext>
-            </a:extLst>
-          </p:cNvPr>
-          <p:cNvPicPr>
-            <a:picLocks noChangeAspect="1"/>
-          </p:cNvPicPr>
-          <p:nvPr/>
-        </p:nvPicPr>
-        <p:blipFill>
-          <a:blip r:embed="rId2"/>
-          <a:stretch>
-            <a:fillRect/>
-          </a:stretch>
-        </p:blipFill>
-        <p:spPr>
-          <a:xfrm>
-            <a:off x="6096000" y="1274279"/>
-            <a:ext cx="5319221" cy="3833192"/>
-          </a:xfrm>
-          <a:prstGeom prst="rect">
-            <a:avLst/>
-          </a:prstGeom>
-        </p:spPr>
-      </p:pic>
-      <p:sp>
-        <p:nvSpPr>
-          <p:cNvPr id="4" name="TextBox 3">
-            <a:extLst>
-              <a:ext uri="{FF2B5EF4-FFF2-40B4-BE49-F238E27FC236}">
-                <a16:creationId xmlns:a16="http://schemas.microsoft.com/office/drawing/2014/main" id="{2C7C0989-B024-49C1-88D3-66C8D786AA68}"/>
-              </a:ext>
-            </a:extLst>
-          </p:cNvPr>
-          <p:cNvSpPr txBox="1"/>
-          <p:nvPr/>
-        </p:nvSpPr>
-        <p:spPr>
-          <a:xfrm>
-            <a:off x="981075" y="583156"/>
-            <a:ext cx="5114925" cy="4801314"/>
-          </a:xfrm>
-          <a:prstGeom prst="rect">
-            <a:avLst/>
-          </a:prstGeom>
-          <a:noFill/>
-        </p:spPr>
-        <p:txBody>
-          <a:bodyPr wrap="square" rtlCol="0">
-            <a:spAutoFit/>
-          </a:bodyPr>
-          <a:lstStyle/>
-          <a:p>
-            <a:r>
-              <a:rPr lang="en-US">
-                <a:solidFill>
-                  <a:schemeClr val="bg1"/>
-                </a:solidFill>
-              </a:rPr>
-              <a:t>if (event.key.code == sf::Keyboard::M)</a:t>
-            </a:r>
-          </a:p>
-          <a:p>
-            <a:endParaRPr lang="en-US">
-              <a:solidFill>
-                <a:schemeClr val="bg1"/>
-              </a:solidFill>
-            </a:endParaRPr>
-          </a:p>
-          <a:p>
-            <a:r>
-              <a:rPr lang="nn-NO">
-                <a:solidFill>
-                  <a:schemeClr val="bg1"/>
-                </a:solidFill>
-              </a:rPr>
-              <a:t>for (int i = 0; i &lt; nodes.size(); i++)</a:t>
-            </a:r>
-          </a:p>
-          <a:p>
-            <a:r>
-              <a:rPr lang="en-US">
-                <a:solidFill>
-                  <a:schemeClr val="bg1"/>
-                </a:solidFill>
-              </a:rPr>
-              <a:t>{</a:t>
-            </a:r>
-          </a:p>
-          <a:p>
-            <a:r>
-              <a:rPr lang="en-US">
-                <a:solidFill>
-                  <a:schemeClr val="bg1"/>
-                </a:solidFill>
-              </a:rPr>
-              <a:t>pos.push_back(nodes[i].getPosition());</a:t>
-            </a:r>
-          </a:p>
-          <a:p>
-            <a:r>
-              <a:rPr lang="en-US">
-                <a:solidFill>
-                  <a:schemeClr val="bg1"/>
-                </a:solidFill>
-              </a:rPr>
-              <a:t>}</a:t>
-            </a:r>
-          </a:p>
-          <a:p>
-            <a:endParaRPr lang="en-US">
-              <a:solidFill>
-                <a:schemeClr val="bg1"/>
-              </a:solidFill>
-            </a:endParaRPr>
-          </a:p>
-          <a:p>
-            <a:r>
-              <a:rPr lang="nn-NO">
-                <a:solidFill>
-                  <a:schemeClr val="bg1"/>
-                </a:solidFill>
-              </a:rPr>
-              <a:t>for (int i = 0; i &lt; pos.size(); i++)</a:t>
-            </a:r>
-          </a:p>
-          <a:p>
-            <a:r>
-              <a:rPr lang="en-US">
-                <a:solidFill>
-                  <a:schemeClr val="bg1"/>
-                </a:solidFill>
-              </a:rPr>
-              <a:t>{</a:t>
-            </a:r>
-          </a:p>
-          <a:p>
-            <a:r>
-              <a:rPr lang="en-US">
-                <a:solidFill>
-                  <a:schemeClr val="bg1"/>
-                </a:solidFill>
-              </a:rPr>
-              <a:t>for (int j = 0; j &lt; pos.size(); j++)</a:t>
-            </a:r>
-          </a:p>
-          <a:p>
-            <a:r>
-              <a:rPr lang="en-US">
-                <a:solidFill>
-                  <a:schemeClr val="bg1"/>
-                </a:solidFill>
-              </a:rPr>
-              <a:t>{</a:t>
-            </a:r>
-          </a:p>
-          <a:p>
-            <a:r>
-              <a:rPr lang="en-US">
-                <a:solidFill>
-                  <a:schemeClr val="bg1"/>
-                </a:solidFill>
-              </a:rPr>
-              <a:t>if (a[i][j])</a:t>
-            </a:r>
-          </a:p>
-          <a:p>
-            <a:r>
-              <a:rPr lang="en-US">
-                <a:solidFill>
-                  <a:schemeClr val="bg1"/>
-                </a:solidFill>
-              </a:rPr>
-              <a:t>{</a:t>
-            </a:r>
-          </a:p>
-          <a:p>
-            <a:r>
-              <a:rPr lang="en-US">
-                <a:solidFill>
-                  <a:schemeClr val="bg1"/>
-                </a:solidFill>
-              </a:rPr>
-              <a:t>draw_edge_store_in_vector(i, j, sf::Color::Black, edges);</a:t>
-            </a:r>
-          </a:p>
-          <a:p>
-            <a:r>
-              <a:rPr lang="en-US">
-                <a:solidFill>
-                  <a:schemeClr val="bg1"/>
-                </a:solidFill>
-              </a:rPr>
-              <a:t>}</a:t>
-            </a:r>
-          </a:p>
-          <a:p>
-            <a:r>
-              <a:rPr lang="en-US">
-                <a:solidFill>
-                  <a:schemeClr val="bg1"/>
-                </a:solidFill>
-              </a:rPr>
-              <a:t>}</a:t>
-            </a:r>
-          </a:p>
-        </p:txBody>
-      </p:sp>
-      <p:sp>
-        <p:nvSpPr>
-          <p:cNvPr id="5" name="TextBox 4">
-            <a:extLst>
-              <a:ext uri="{FF2B5EF4-FFF2-40B4-BE49-F238E27FC236}">
-                <a16:creationId xmlns:a16="http://schemas.microsoft.com/office/drawing/2014/main" id="{141408A5-C076-46E9-A63A-19566E868302}"/>
-              </a:ext>
-            </a:extLst>
-          </p:cNvPr>
-          <p:cNvSpPr txBox="1"/>
-          <p:nvPr/>
-        </p:nvSpPr>
-        <p:spPr>
-          <a:xfrm>
-            <a:off x="9537192" y="210312"/>
-            <a:ext cx="2322576" cy="830997"/>
-          </a:xfrm>
-          <a:prstGeom prst="rect">
-            <a:avLst/>
-          </a:prstGeom>
-          <a:noFill/>
-        </p:spPr>
-        <p:txBody>
-          <a:bodyPr wrap="square" rtlCol="0">
-            <a:spAutoFit/>
-          </a:bodyPr>
-          <a:lstStyle/>
-          <a:p>
-            <a:r>
-              <a:rPr lang="en-US" sz="4800">
-                <a:solidFill>
-                  <a:schemeClr val="bg1"/>
-                </a:solidFill>
-              </a:rPr>
-              <a:t>Ziua 2</a:t>
-            </a:r>
-          </a:p>
-        </p:txBody>
-      </p:sp>
-    </p:spTree>
-    <p:extLst>
-      <p:ext uri="{BB962C8B-B14F-4D97-AF65-F5344CB8AC3E}">
-        <p14:creationId xmlns:p14="http://schemas.microsoft.com/office/powerpoint/2010/main" val="1706201723"/>
       </p:ext>
     </p:extLst>
   </p:cSld>

</xml_diff>